<commit_message>
update uncapsulation - bus
</commit_message>
<xml_diff>
--- a/1. Bahan Ajar/PribadiTeguh-PBO-TI20192020-3-4-04.Encapsulation.pptx
+++ b/1. Bahan Ajar/PribadiTeguh-PBO-TI20192020-3-4-04.Encapsulation.pptx
@@ -6,10 +6,10 @@
     <p:sldMasterId id="2147483666" r:id="rId2"/>
   </p:sldMasterIdLst>
   <p:notesMasterIdLst>
-    <p:notesMasterId r:id="rId19"/>
+    <p:notesMasterId r:id="rId23"/>
   </p:notesMasterIdLst>
   <p:handoutMasterIdLst>
-    <p:handoutMasterId r:id="rId20"/>
+    <p:handoutMasterId r:id="rId24"/>
   </p:handoutMasterIdLst>
   <p:sldIdLst>
     <p:sldId id="256" r:id="rId3"/>
@@ -24,10 +24,14 @@
     <p:sldId id="541" r:id="rId12"/>
     <p:sldId id="542" r:id="rId13"/>
     <p:sldId id="543" r:id="rId14"/>
-    <p:sldId id="547" r:id="rId15"/>
-    <p:sldId id="549" r:id="rId16"/>
-    <p:sldId id="548" r:id="rId17"/>
-    <p:sldId id="546" r:id="rId18"/>
+    <p:sldId id="552" r:id="rId15"/>
+    <p:sldId id="551" r:id="rId16"/>
+    <p:sldId id="553" r:id="rId17"/>
+    <p:sldId id="554" r:id="rId18"/>
+    <p:sldId id="547" r:id="rId19"/>
+    <p:sldId id="549" r:id="rId20"/>
+    <p:sldId id="548" r:id="rId21"/>
+    <p:sldId id="546" r:id="rId22"/>
   </p:sldIdLst>
   <p:sldSz cx="9144000" cy="6858000" type="screen4x3"/>
   <p:notesSz cx="6858000" cy="9144000"/>
@@ -5992,22 +5996,12 @@
           <a:lstStyle/>
           <a:p>
             <a:r>
-              <a:rPr lang="en-US" dirty="0"/>
-              <a:t>b. </a:t>
-            </a:r>
-            <a:r>
               <a:rPr lang="en-US" dirty="0" err="1"/>
               <a:t>Notasi</a:t>
             </a:r>
             <a:r>
               <a:rPr lang="en-US" dirty="0"/>
-              <a:t> UML (class diagram) </a:t>
-            </a:r>
-            <a:r>
-              <a:rPr lang="en-US" dirty="0">
-                <a:sym typeface="Wingdings" panose="05000000000000000000" pitchFamily="2" charset="2"/>
-              </a:rPr>
-              <a:t> coding java</a:t>
+              <a:t> UML (class diagram)</a:t>
             </a:r>
             <a:endParaRPr lang="en-ID" dirty="0"/>
           </a:p>
@@ -6033,6 +6027,25 @@
         <p:txBody>
           <a:bodyPr/>
           <a:lstStyle/>
+          <a:p>
+            <a:r>
+              <a:rPr lang="en-US" dirty="0"/>
+              <a:t>Default (none) :                                                        </a:t>
+            </a:r>
+            <a:r>
+              <a:rPr lang="en-US" sz="1800" i="1" dirty="0"/>
+              <a:t>(</a:t>
+            </a:r>
+            <a:r>
+              <a:rPr lang="en-US" sz="1800" i="1" dirty="0" err="1"/>
+              <a:t>kosong</a:t>
+            </a:r>
+            <a:r>
+              <a:rPr lang="en-US" sz="1800" i="1" dirty="0"/>
+              <a:t>)</a:t>
+            </a:r>
+            <a:endParaRPr lang="en-US" i="1" dirty="0"/>
+          </a:p>
           <a:p>
             <a:r>
               <a:rPr lang="en-US" dirty="0"/>
@@ -6090,7 +6103,7 @@
         </p:blipFill>
         <p:spPr bwMode="auto">
           <a:xfrm>
-            <a:off x="1375954" y="3311434"/>
+            <a:off x="1375954" y="3664134"/>
             <a:ext cx="4435792" cy="2812600"/>
           </a:xfrm>
           <a:prstGeom prst="rect">
@@ -6137,7 +6150,7 @@
         </p:blipFill>
         <p:spPr bwMode="auto">
           <a:xfrm>
-            <a:off x="6049871" y="3311434"/>
+            <a:off x="6049871" y="3664134"/>
             <a:ext cx="2507660" cy="2704339"/>
           </a:xfrm>
           <a:prstGeom prst="rect">
@@ -6169,6 +6182,648 @@
 </file>
 
 <file path=ppt/slides/slide13.xml><?xml version="1.0" encoding="utf-8"?>
+<p:sld xmlns:a="http://schemas.openxmlformats.org/drawingml/2006/main" xmlns:r="http://schemas.openxmlformats.org/officeDocument/2006/relationships" xmlns:p="http://schemas.openxmlformats.org/presentationml/2006/main">
+  <p:cSld>
+    <p:spTree>
+      <p:nvGrpSpPr>
+        <p:cNvPr id="1" name=""/>
+        <p:cNvGrpSpPr/>
+        <p:nvPr/>
+      </p:nvGrpSpPr>
+      <p:grpSpPr>
+        <a:xfrm>
+          <a:off x="0" y="0"/>
+          <a:ext cx="0" cy="0"/>
+          <a:chOff x="0" y="0"/>
+          <a:chExt cx="0" cy="0"/>
+        </a:xfrm>
+      </p:grpSpPr>
+      <p:sp>
+        <p:nvSpPr>
+          <p:cNvPr id="2" name="Title 1">
+            <a:extLst>
+              <a:ext uri="{FF2B5EF4-FFF2-40B4-BE49-F238E27FC236}">
+                <a16:creationId xmlns:a16="http://schemas.microsoft.com/office/drawing/2014/main" id="{E8E70786-A0A3-462F-A7EF-5E958F9770FB}"/>
+              </a:ext>
+            </a:extLst>
+          </p:cNvPr>
+          <p:cNvSpPr>
+            <a:spLocks noGrp="1"/>
+          </p:cNvSpPr>
+          <p:nvPr>
+            <p:ph type="title"/>
+          </p:nvPr>
+        </p:nvSpPr>
+        <p:spPr/>
+        <p:txBody>
+          <a:bodyPr/>
+          <a:lstStyle/>
+          <a:p>
+            <a:r>
+              <a:rPr lang="en-US" dirty="0"/>
+              <a:t>b. </a:t>
+            </a:r>
+            <a:r>
+              <a:rPr lang="en-US" dirty="0" err="1"/>
+              <a:t>Analisis</a:t>
+            </a:r>
+            <a:r>
+              <a:rPr lang="en-US" dirty="0"/>
+              <a:t> UML(class diagram) : </a:t>
+            </a:r>
+            <a:r>
+              <a:rPr lang="en-US" b="1" dirty="0"/>
+              <a:t>bus</a:t>
+            </a:r>
+            <a:br>
+              <a:rPr lang="en-US" b="1" dirty="0"/>
+            </a:br>
+            <a:r>
+              <a:rPr lang="en-US" sz="3200" dirty="0"/>
+              <a:t>(</a:t>
+            </a:r>
+            <a:r>
+              <a:rPr lang="en-US" sz="3200" dirty="0" err="1">
+                <a:solidFill>
+                  <a:srgbClr val="FF0000"/>
+                </a:solidFill>
+              </a:rPr>
+              <a:t>tanpa</a:t>
+            </a:r>
+            <a:r>
+              <a:rPr lang="en-US" sz="3200" dirty="0">
+                <a:solidFill>
+                  <a:srgbClr val="FF0000"/>
+                </a:solidFill>
+              </a:rPr>
+              <a:t> encapsulation</a:t>
+            </a:r>
+            <a:r>
+              <a:rPr lang="en-US" sz="3200" dirty="0"/>
+              <a:t>)</a:t>
+            </a:r>
+            <a:endParaRPr lang="en-ID" b="1" dirty="0"/>
+          </a:p>
+        </p:txBody>
+      </p:sp>
+      <p:sp>
+        <p:nvSpPr>
+          <p:cNvPr id="3" name="Content Placeholder 2">
+            <a:extLst>
+              <a:ext uri="{FF2B5EF4-FFF2-40B4-BE49-F238E27FC236}">
+                <a16:creationId xmlns:a16="http://schemas.microsoft.com/office/drawing/2014/main" id="{456B55CB-AA28-4B5E-8F8B-78A0E20B10F9}"/>
+              </a:ext>
+            </a:extLst>
+          </p:cNvPr>
+          <p:cNvSpPr>
+            <a:spLocks noGrp="1"/>
+          </p:cNvSpPr>
+          <p:nvPr>
+            <p:ph idx="1"/>
+          </p:nvPr>
+        </p:nvSpPr>
+        <p:spPr>
+          <a:xfrm>
+            <a:off x="476251" y="3581091"/>
+            <a:ext cx="8319406" cy="2937565"/>
+          </a:xfrm>
+        </p:spPr>
+        <p:txBody>
+          <a:bodyPr/>
+          <a:lstStyle/>
+          <a:p>
+            <a:r>
+              <a:rPr lang="en-US" dirty="0"/>
+              <a:t>Class?</a:t>
+            </a:r>
+          </a:p>
+          <a:p>
+            <a:r>
+              <a:rPr lang="en-US" dirty="0"/>
+              <a:t>Property?</a:t>
+            </a:r>
+          </a:p>
+          <a:p>
+            <a:r>
+              <a:rPr lang="en-US" dirty="0"/>
+              <a:t>Method?</a:t>
+            </a:r>
+            <a:endParaRPr lang="en-ID" dirty="0"/>
+          </a:p>
+        </p:txBody>
+      </p:sp>
+      <p:pic>
+        <p:nvPicPr>
+          <p:cNvPr id="5" name="Picture 4">
+            <a:extLst>
+              <a:ext uri="{FF2B5EF4-FFF2-40B4-BE49-F238E27FC236}">
+                <a16:creationId xmlns:a16="http://schemas.microsoft.com/office/drawing/2014/main" id="{43BFAFD6-EAAD-4864-A16A-87E70BC262EC}"/>
+              </a:ext>
+            </a:extLst>
+          </p:cNvPr>
+          <p:cNvPicPr>
+            <a:picLocks noChangeAspect="1"/>
+          </p:cNvPicPr>
+          <p:nvPr/>
+        </p:nvPicPr>
+        <p:blipFill>
+          <a:blip r:embed="rId2"/>
+          <a:stretch>
+            <a:fillRect/>
+          </a:stretch>
+        </p:blipFill>
+        <p:spPr>
+          <a:xfrm>
+            <a:off x="3293821" y="1361333"/>
+            <a:ext cx="2684266" cy="2219759"/>
+          </a:xfrm>
+          <a:prstGeom prst="rect">
+            <a:avLst/>
+          </a:prstGeom>
+        </p:spPr>
+      </p:pic>
+    </p:spTree>
+    <p:extLst>
+      <p:ext uri="{BB962C8B-B14F-4D97-AF65-F5344CB8AC3E}">
+        <p14:creationId xmlns:p14="http://schemas.microsoft.com/office/powerpoint/2010/main" val="2773074521"/>
+      </p:ext>
+    </p:extLst>
+  </p:cSld>
+  <p:clrMapOvr>
+    <a:masterClrMapping/>
+  </p:clrMapOvr>
+</p:sld>
+</file>
+
+<file path=ppt/slides/slide14.xml><?xml version="1.0" encoding="utf-8"?>
+<p:sld xmlns:a="http://schemas.openxmlformats.org/drawingml/2006/main" xmlns:r="http://schemas.openxmlformats.org/officeDocument/2006/relationships" xmlns:p="http://schemas.openxmlformats.org/presentationml/2006/main">
+  <p:cSld>
+    <p:spTree>
+      <p:nvGrpSpPr>
+        <p:cNvPr id="1" name=""/>
+        <p:cNvGrpSpPr/>
+        <p:nvPr/>
+      </p:nvGrpSpPr>
+      <p:grpSpPr>
+        <a:xfrm>
+          <a:off x="0" y="0"/>
+          <a:ext cx="0" cy="0"/>
+          <a:chOff x="0" y="0"/>
+          <a:chExt cx="0" cy="0"/>
+        </a:xfrm>
+      </p:grpSpPr>
+      <p:sp>
+        <p:nvSpPr>
+          <p:cNvPr id="2" name="Title 1">
+            <a:extLst>
+              <a:ext uri="{FF2B5EF4-FFF2-40B4-BE49-F238E27FC236}">
+                <a16:creationId xmlns:a16="http://schemas.microsoft.com/office/drawing/2014/main" id="{E8E70786-A0A3-462F-A7EF-5E958F9770FB}"/>
+              </a:ext>
+            </a:extLst>
+          </p:cNvPr>
+          <p:cNvSpPr>
+            <a:spLocks noGrp="1"/>
+          </p:cNvSpPr>
+          <p:nvPr>
+            <p:ph type="title"/>
+          </p:nvPr>
+        </p:nvSpPr>
+        <p:spPr/>
+        <p:txBody>
+          <a:bodyPr/>
+          <a:lstStyle/>
+          <a:p>
+            <a:r>
+              <a:rPr lang="en-US" dirty="0" err="1"/>
+              <a:t>Analisis</a:t>
+            </a:r>
+            <a:r>
+              <a:rPr lang="en-US" dirty="0"/>
+              <a:t> UML(class diagram) : </a:t>
+            </a:r>
+            <a:r>
+              <a:rPr lang="en-US" b="1" dirty="0"/>
+              <a:t>bus</a:t>
+            </a:r>
+            <a:br>
+              <a:rPr lang="en-US" b="1" dirty="0"/>
+            </a:br>
+            <a:r>
+              <a:rPr lang="en-US" sz="3200" dirty="0"/>
+              <a:t>(</a:t>
+            </a:r>
+            <a:r>
+              <a:rPr lang="en-US" sz="3200" dirty="0" err="1">
+                <a:solidFill>
+                  <a:srgbClr val="FF0000"/>
+                </a:solidFill>
+              </a:rPr>
+              <a:t>tanpa</a:t>
+            </a:r>
+            <a:r>
+              <a:rPr lang="en-US" sz="3200" dirty="0">
+                <a:solidFill>
+                  <a:srgbClr val="FF0000"/>
+                </a:solidFill>
+              </a:rPr>
+              <a:t> encapsulation</a:t>
+            </a:r>
+            <a:r>
+              <a:rPr lang="en-US" sz="3200" dirty="0"/>
+              <a:t>)</a:t>
+            </a:r>
+            <a:endParaRPr lang="en-ID" b="1" dirty="0"/>
+          </a:p>
+        </p:txBody>
+      </p:sp>
+      <p:sp>
+        <p:nvSpPr>
+          <p:cNvPr id="3" name="Content Placeholder 2">
+            <a:extLst>
+              <a:ext uri="{FF2B5EF4-FFF2-40B4-BE49-F238E27FC236}">
+                <a16:creationId xmlns:a16="http://schemas.microsoft.com/office/drawing/2014/main" id="{456B55CB-AA28-4B5E-8F8B-78A0E20B10F9}"/>
+              </a:ext>
+            </a:extLst>
+          </p:cNvPr>
+          <p:cNvSpPr>
+            <a:spLocks noGrp="1"/>
+          </p:cNvSpPr>
+          <p:nvPr>
+            <p:ph idx="1"/>
+          </p:nvPr>
+        </p:nvSpPr>
+        <p:spPr/>
+        <p:txBody>
+          <a:bodyPr/>
+          <a:lstStyle/>
+          <a:p>
+            <a:endParaRPr lang="en-ID" dirty="0"/>
+          </a:p>
+        </p:txBody>
+      </p:sp>
+      <p:pic>
+        <p:nvPicPr>
+          <p:cNvPr id="4" name="Picture 3">
+            <a:extLst>
+              <a:ext uri="{FF2B5EF4-FFF2-40B4-BE49-F238E27FC236}">
+                <a16:creationId xmlns:a16="http://schemas.microsoft.com/office/drawing/2014/main" id="{F6DA8C02-73EB-4082-B60C-E9E811D4D28F}"/>
+              </a:ext>
+            </a:extLst>
+          </p:cNvPr>
+          <p:cNvPicPr>
+            <a:picLocks noChangeAspect="1"/>
+          </p:cNvPicPr>
+          <p:nvPr/>
+        </p:nvPicPr>
+        <p:blipFill>
+          <a:blip r:embed="rId2"/>
+          <a:stretch>
+            <a:fillRect/>
+          </a:stretch>
+        </p:blipFill>
+        <p:spPr>
+          <a:xfrm>
+            <a:off x="0" y="1658982"/>
+            <a:ext cx="9144000" cy="4659363"/>
+          </a:xfrm>
+          <a:prstGeom prst="rect">
+            <a:avLst/>
+          </a:prstGeom>
+        </p:spPr>
+      </p:pic>
+    </p:spTree>
+    <p:extLst>
+      <p:ext uri="{BB962C8B-B14F-4D97-AF65-F5344CB8AC3E}">
+        <p14:creationId xmlns:p14="http://schemas.microsoft.com/office/powerpoint/2010/main" val="3824497438"/>
+      </p:ext>
+    </p:extLst>
+  </p:cSld>
+  <p:clrMapOvr>
+    <a:masterClrMapping/>
+  </p:clrMapOvr>
+</p:sld>
+</file>
+
+<file path=ppt/slides/slide15.xml><?xml version="1.0" encoding="utf-8"?>
+<p:sld xmlns:a="http://schemas.openxmlformats.org/drawingml/2006/main" xmlns:r="http://schemas.openxmlformats.org/officeDocument/2006/relationships" xmlns:p="http://schemas.openxmlformats.org/presentationml/2006/main">
+  <p:cSld>
+    <p:spTree>
+      <p:nvGrpSpPr>
+        <p:cNvPr id="1" name=""/>
+        <p:cNvGrpSpPr/>
+        <p:nvPr/>
+      </p:nvGrpSpPr>
+      <p:grpSpPr>
+        <a:xfrm>
+          <a:off x="0" y="0"/>
+          <a:ext cx="0" cy="0"/>
+          <a:chOff x="0" y="0"/>
+          <a:chExt cx="0" cy="0"/>
+        </a:xfrm>
+      </p:grpSpPr>
+      <p:sp>
+        <p:nvSpPr>
+          <p:cNvPr id="2" name="Title 1">
+            <a:extLst>
+              <a:ext uri="{FF2B5EF4-FFF2-40B4-BE49-F238E27FC236}">
+                <a16:creationId xmlns:a16="http://schemas.microsoft.com/office/drawing/2014/main" id="{E8E70786-A0A3-462F-A7EF-5E958F9770FB}"/>
+              </a:ext>
+            </a:extLst>
+          </p:cNvPr>
+          <p:cNvSpPr>
+            <a:spLocks noGrp="1"/>
+          </p:cNvSpPr>
+          <p:nvPr>
+            <p:ph type="title"/>
+          </p:nvPr>
+        </p:nvSpPr>
+        <p:spPr/>
+        <p:txBody>
+          <a:bodyPr/>
+          <a:lstStyle/>
+          <a:p>
+            <a:r>
+              <a:rPr lang="en-US" dirty="0" err="1"/>
+              <a:t>Analisis</a:t>
+            </a:r>
+            <a:r>
+              <a:rPr lang="en-US" dirty="0"/>
+              <a:t> UML(class diagram) : </a:t>
+            </a:r>
+            <a:r>
+              <a:rPr lang="en-US" b="1" dirty="0"/>
+              <a:t>bus2</a:t>
+            </a:r>
+            <a:br>
+              <a:rPr lang="en-US" b="1" dirty="0"/>
+            </a:br>
+            <a:r>
+              <a:rPr lang="en-US" sz="3200" dirty="0"/>
+              <a:t>(</a:t>
+            </a:r>
+            <a:r>
+              <a:rPr lang="en-US" sz="3200" dirty="0" err="1">
+                <a:solidFill>
+                  <a:srgbClr val="FF0000"/>
+                </a:solidFill>
+              </a:rPr>
+              <a:t>dengan</a:t>
+            </a:r>
+            <a:r>
+              <a:rPr lang="en-US" sz="3200" dirty="0">
+                <a:solidFill>
+                  <a:srgbClr val="FF0000"/>
+                </a:solidFill>
+              </a:rPr>
+              <a:t> encapsulation</a:t>
+            </a:r>
+            <a:r>
+              <a:rPr lang="en-US" sz="3200" dirty="0"/>
+              <a:t>)</a:t>
+            </a:r>
+            <a:endParaRPr lang="en-ID" b="1" dirty="0"/>
+          </a:p>
+        </p:txBody>
+      </p:sp>
+      <p:sp>
+        <p:nvSpPr>
+          <p:cNvPr id="3" name="Content Placeholder 2">
+            <a:extLst>
+              <a:ext uri="{FF2B5EF4-FFF2-40B4-BE49-F238E27FC236}">
+                <a16:creationId xmlns:a16="http://schemas.microsoft.com/office/drawing/2014/main" id="{456B55CB-AA28-4B5E-8F8B-78A0E20B10F9}"/>
+              </a:ext>
+            </a:extLst>
+          </p:cNvPr>
+          <p:cNvSpPr>
+            <a:spLocks noGrp="1"/>
+          </p:cNvSpPr>
+          <p:nvPr>
+            <p:ph idx="1"/>
+          </p:nvPr>
+        </p:nvSpPr>
+        <p:spPr>
+          <a:xfrm>
+            <a:off x="476251" y="3581091"/>
+            <a:ext cx="8319406" cy="2937565"/>
+          </a:xfrm>
+        </p:spPr>
+        <p:txBody>
+          <a:bodyPr/>
+          <a:lstStyle/>
+          <a:p>
+            <a:r>
+              <a:rPr lang="en-US" dirty="0"/>
+              <a:t>Class?</a:t>
+            </a:r>
+          </a:p>
+          <a:p>
+            <a:r>
+              <a:rPr lang="en-US" dirty="0"/>
+              <a:t>Property?</a:t>
+            </a:r>
+          </a:p>
+          <a:p>
+            <a:r>
+              <a:rPr lang="en-US" dirty="0"/>
+              <a:t>Method?</a:t>
+            </a:r>
+            <a:endParaRPr lang="en-ID" dirty="0"/>
+          </a:p>
+        </p:txBody>
+      </p:sp>
+      <p:pic>
+        <p:nvPicPr>
+          <p:cNvPr id="4" name="Picture 3">
+            <a:extLst>
+              <a:ext uri="{FF2B5EF4-FFF2-40B4-BE49-F238E27FC236}">
+                <a16:creationId xmlns:a16="http://schemas.microsoft.com/office/drawing/2014/main" id="{D9CDC6DD-4B15-4CA0-B607-A81B454AA369}"/>
+              </a:ext>
+            </a:extLst>
+          </p:cNvPr>
+          <p:cNvPicPr>
+            <a:picLocks noChangeAspect="1"/>
+          </p:cNvPicPr>
+          <p:nvPr/>
+        </p:nvPicPr>
+        <p:blipFill>
+          <a:blip r:embed="rId2"/>
+          <a:stretch>
+            <a:fillRect/>
+          </a:stretch>
+        </p:blipFill>
+        <p:spPr>
+          <a:xfrm>
+            <a:off x="3386545" y="1298148"/>
+            <a:ext cx="2370909" cy="2282943"/>
+          </a:xfrm>
+          <a:prstGeom prst="rect">
+            <a:avLst/>
+          </a:prstGeom>
+        </p:spPr>
+      </p:pic>
+    </p:spTree>
+    <p:extLst>
+      <p:ext uri="{BB962C8B-B14F-4D97-AF65-F5344CB8AC3E}">
+        <p14:creationId xmlns:p14="http://schemas.microsoft.com/office/powerpoint/2010/main" val="803265388"/>
+      </p:ext>
+    </p:extLst>
+  </p:cSld>
+  <p:clrMapOvr>
+    <a:masterClrMapping/>
+  </p:clrMapOvr>
+</p:sld>
+</file>
+
+<file path=ppt/slides/slide16.xml><?xml version="1.0" encoding="utf-8"?>
+<p:sld xmlns:a="http://schemas.openxmlformats.org/drawingml/2006/main" xmlns:r="http://schemas.openxmlformats.org/officeDocument/2006/relationships" xmlns:p="http://schemas.openxmlformats.org/presentationml/2006/main">
+  <p:cSld>
+    <p:spTree>
+      <p:nvGrpSpPr>
+        <p:cNvPr id="1" name=""/>
+        <p:cNvGrpSpPr/>
+        <p:nvPr/>
+      </p:nvGrpSpPr>
+      <p:grpSpPr>
+        <a:xfrm>
+          <a:off x="0" y="0"/>
+          <a:ext cx="0" cy="0"/>
+          <a:chOff x="0" y="0"/>
+          <a:chExt cx="0" cy="0"/>
+        </a:xfrm>
+      </p:grpSpPr>
+      <p:sp>
+        <p:nvSpPr>
+          <p:cNvPr id="2" name="Title 1">
+            <a:extLst>
+              <a:ext uri="{FF2B5EF4-FFF2-40B4-BE49-F238E27FC236}">
+                <a16:creationId xmlns:a16="http://schemas.microsoft.com/office/drawing/2014/main" id="{E8E70786-A0A3-462F-A7EF-5E958F9770FB}"/>
+              </a:ext>
+            </a:extLst>
+          </p:cNvPr>
+          <p:cNvSpPr>
+            <a:spLocks noGrp="1"/>
+          </p:cNvSpPr>
+          <p:nvPr>
+            <p:ph type="title"/>
+          </p:nvPr>
+        </p:nvSpPr>
+        <p:spPr/>
+        <p:txBody>
+          <a:bodyPr/>
+          <a:lstStyle/>
+          <a:p>
+            <a:r>
+              <a:rPr lang="en-US" dirty="0" err="1"/>
+              <a:t>Analisis</a:t>
+            </a:r>
+            <a:r>
+              <a:rPr lang="en-US" dirty="0"/>
+              <a:t> UML(class diagram) : </a:t>
+            </a:r>
+            <a:r>
+              <a:rPr lang="en-US" b="1" dirty="0"/>
+              <a:t>bus2</a:t>
+            </a:r>
+            <a:br>
+              <a:rPr lang="en-US" b="1" dirty="0"/>
+            </a:br>
+            <a:r>
+              <a:rPr lang="en-US" sz="3200" dirty="0"/>
+              <a:t>(</a:t>
+            </a:r>
+            <a:r>
+              <a:rPr lang="en-US" sz="3200" dirty="0" err="1">
+                <a:solidFill>
+                  <a:srgbClr val="FF0000"/>
+                </a:solidFill>
+              </a:rPr>
+              <a:t>dengan</a:t>
+            </a:r>
+            <a:r>
+              <a:rPr lang="en-US" sz="3200" dirty="0">
+                <a:solidFill>
+                  <a:srgbClr val="FF0000"/>
+                </a:solidFill>
+              </a:rPr>
+              <a:t> encapsulation</a:t>
+            </a:r>
+            <a:r>
+              <a:rPr lang="en-US" sz="3200" dirty="0"/>
+              <a:t>)</a:t>
+            </a:r>
+            <a:endParaRPr lang="en-ID" b="1" dirty="0"/>
+          </a:p>
+        </p:txBody>
+      </p:sp>
+      <p:sp>
+        <p:nvSpPr>
+          <p:cNvPr id="3" name="Content Placeholder 2">
+            <a:extLst>
+              <a:ext uri="{FF2B5EF4-FFF2-40B4-BE49-F238E27FC236}">
+                <a16:creationId xmlns:a16="http://schemas.microsoft.com/office/drawing/2014/main" id="{456B55CB-AA28-4B5E-8F8B-78A0E20B10F9}"/>
+              </a:ext>
+            </a:extLst>
+          </p:cNvPr>
+          <p:cNvSpPr>
+            <a:spLocks noGrp="1"/>
+          </p:cNvSpPr>
+          <p:nvPr>
+            <p:ph idx="1"/>
+          </p:nvPr>
+        </p:nvSpPr>
+        <p:spPr/>
+        <p:txBody>
+          <a:bodyPr/>
+          <a:lstStyle/>
+          <a:p>
+            <a:endParaRPr lang="en-ID" dirty="0"/>
+          </a:p>
+        </p:txBody>
+      </p:sp>
+      <p:pic>
+        <p:nvPicPr>
+          <p:cNvPr id="5" name="Picture 4">
+            <a:extLst>
+              <a:ext uri="{FF2B5EF4-FFF2-40B4-BE49-F238E27FC236}">
+                <a16:creationId xmlns:a16="http://schemas.microsoft.com/office/drawing/2014/main" id="{A33DD886-AA04-4D8C-83C8-13D4243CBFDB}"/>
+              </a:ext>
+            </a:extLst>
+          </p:cNvPr>
+          <p:cNvPicPr>
+            <a:picLocks noChangeAspect="1"/>
+          </p:cNvPicPr>
+          <p:nvPr/>
+        </p:nvPicPr>
+        <p:blipFill>
+          <a:blip r:embed="rId2"/>
+          <a:stretch>
+            <a:fillRect/>
+          </a:stretch>
+        </p:blipFill>
+        <p:spPr>
+          <a:xfrm>
+            <a:off x="0" y="1736200"/>
+            <a:ext cx="9144000" cy="4782457"/>
+          </a:xfrm>
+          <a:prstGeom prst="rect">
+            <a:avLst/>
+          </a:prstGeom>
+        </p:spPr>
+      </p:pic>
+    </p:spTree>
+    <p:extLst>
+      <p:ext uri="{BB962C8B-B14F-4D97-AF65-F5344CB8AC3E}">
+        <p14:creationId xmlns:p14="http://schemas.microsoft.com/office/powerpoint/2010/main" val="3022833711"/>
+      </p:ext>
+    </p:extLst>
+  </p:cSld>
+  <p:clrMapOvr>
+    <a:masterClrMapping/>
+  </p:clrMapOvr>
+</p:sld>
+</file>
+
+<file path=ppt/slides/slide17.xml><?xml version="1.0" encoding="utf-8"?>
 <p:sld xmlns:a="http://schemas.openxmlformats.org/drawingml/2006/main" xmlns:r="http://schemas.openxmlformats.org/officeDocument/2006/relationships" xmlns:p="http://schemas.openxmlformats.org/presentationml/2006/main">
   <p:cSld>
     <p:spTree>
@@ -6443,7 +7098,7 @@
 </p:sld>
 </file>
 
-<file path=ppt/slides/slide14.xml><?xml version="1.0" encoding="utf-8"?>
+<file path=ppt/slides/slide18.xml><?xml version="1.0" encoding="utf-8"?>
 <p:sld xmlns:a="http://schemas.openxmlformats.org/drawingml/2006/main" xmlns:r="http://schemas.openxmlformats.org/officeDocument/2006/relationships" xmlns:p="http://schemas.openxmlformats.org/presentationml/2006/main">
   <p:cSld>
     <p:spTree>
@@ -6561,7 +7216,7 @@
 </p:sld>
 </file>
 
-<file path=ppt/slides/slide15.xml><?xml version="1.0" encoding="utf-8"?>
+<file path=ppt/slides/slide19.xml><?xml version="1.0" encoding="utf-8"?>
 <p:sld xmlns:a="http://schemas.openxmlformats.org/drawingml/2006/main" xmlns:r="http://schemas.openxmlformats.org/officeDocument/2006/relationships" xmlns:p="http://schemas.openxmlformats.org/presentationml/2006/main">
   <p:cSld>
     <p:spTree>
@@ -6694,7 +7349,166 @@
 </p:sld>
 </file>
 
-<file path=ppt/slides/slide16.xml><?xml version="1.0" encoding="utf-8"?>
+<file path=ppt/slides/slide2.xml><?xml version="1.0" encoding="utf-8"?>
+<p:sld xmlns:a="http://schemas.openxmlformats.org/drawingml/2006/main" xmlns:r="http://schemas.openxmlformats.org/officeDocument/2006/relationships" xmlns:p="http://schemas.openxmlformats.org/presentationml/2006/main">
+  <p:cSld>
+    <p:spTree>
+      <p:nvGrpSpPr>
+        <p:cNvPr id="1" name=""/>
+        <p:cNvGrpSpPr/>
+        <p:nvPr/>
+      </p:nvGrpSpPr>
+      <p:grpSpPr>
+        <a:xfrm>
+          <a:off x="0" y="0"/>
+          <a:ext cx="0" cy="0"/>
+          <a:chOff x="0" y="0"/>
+          <a:chExt cx="0" cy="0"/>
+        </a:xfrm>
+      </p:grpSpPr>
+      <p:sp>
+        <p:nvSpPr>
+          <p:cNvPr id="2" name="Title 1"/>
+          <p:cNvSpPr>
+            <a:spLocks noGrp="1"/>
+          </p:cNvSpPr>
+          <p:nvPr>
+            <p:ph type="title"/>
+          </p:nvPr>
+        </p:nvSpPr>
+        <p:spPr/>
+        <p:txBody>
+          <a:bodyPr/>
+          <a:lstStyle/>
+          <a:p>
+            <a:r>
+              <a:rPr lang="id-ID" b="1" dirty="0"/>
+              <a:t>0</a:t>
+            </a:r>
+            <a:r>
+              <a:rPr lang="en-US" b="1" dirty="0"/>
+              <a:t>4</a:t>
+            </a:r>
+            <a:r>
+              <a:rPr lang="id-ID" b="1" dirty="0"/>
+              <a:t>. </a:t>
+            </a:r>
+            <a:r>
+              <a:rPr lang="en-US" b="1" dirty="0"/>
+              <a:t>Encapsulation</a:t>
+            </a:r>
+            <a:endParaRPr lang="en-US" b="1" dirty="0">
+              <a:latin typeface="Agency FB" panose="020B0503020202020204" pitchFamily="34" charset="0"/>
+            </a:endParaRPr>
+          </a:p>
+        </p:txBody>
+      </p:sp>
+      <p:sp>
+        <p:nvSpPr>
+          <p:cNvPr id="3" name="Content Placeholder 2"/>
+          <p:cNvSpPr>
+            <a:spLocks noGrp="1"/>
+          </p:cNvSpPr>
+          <p:nvPr>
+            <p:ph idx="1"/>
+          </p:nvPr>
+        </p:nvSpPr>
+        <p:spPr/>
+        <p:txBody>
+          <a:bodyPr/>
+          <a:lstStyle/>
+          <a:p>
+            <a:pPr marL="463550" indent="-463550">
+              <a:buFont typeface="+mj-lt"/>
+              <a:buAutoNum type="arabicParenR"/>
+            </a:pPr>
+            <a:r>
+              <a:rPr lang="en-US" dirty="0" err="1">
+                <a:latin typeface="Agency FB" panose="020B0503020202020204" pitchFamily="34" charset="0"/>
+              </a:rPr>
+              <a:t>Konsep</a:t>
+            </a:r>
+            <a:r>
+              <a:rPr lang="en-US" dirty="0">
+                <a:latin typeface="Agency FB" panose="020B0503020202020204" pitchFamily="34" charset="0"/>
+              </a:rPr>
+              <a:t> Encapsulation</a:t>
+            </a:r>
+          </a:p>
+          <a:p>
+            <a:pPr marL="463550" indent="-463550">
+              <a:buFont typeface="+mj-lt"/>
+              <a:buAutoNum type="arabicParenR"/>
+            </a:pPr>
+            <a:r>
+              <a:rPr lang="en-US" dirty="0">
+                <a:latin typeface="Agency FB" panose="020B0503020202020204" pitchFamily="34" charset="0"/>
+              </a:rPr>
+              <a:t>Access Modifier</a:t>
+            </a:r>
+          </a:p>
+          <a:p>
+            <a:pPr marL="463550" indent="-463550">
+              <a:buFont typeface="+mj-lt"/>
+              <a:buAutoNum type="arabicParenR"/>
+            </a:pPr>
+            <a:r>
+              <a:rPr lang="en-US" dirty="0">
+                <a:latin typeface="Agency FB" panose="020B0503020202020204" pitchFamily="34" charset="0"/>
+              </a:rPr>
+              <a:t>UML class diagram </a:t>
+            </a:r>
+            <a:r>
+              <a:rPr lang="en-US" dirty="0">
+                <a:latin typeface="Agency FB" panose="020B0503020202020204" pitchFamily="34" charset="0"/>
+                <a:sym typeface="Wingdings" panose="05000000000000000000" pitchFamily="2" charset="2"/>
+              </a:rPr>
+              <a:t></a:t>
+            </a:r>
+            <a:r>
+              <a:rPr lang="en-US" dirty="0">
+                <a:latin typeface="Agency FB" panose="020B0503020202020204" pitchFamily="34" charset="0"/>
+              </a:rPr>
+              <a:t> code</a:t>
+            </a:r>
+          </a:p>
+          <a:p>
+            <a:pPr marL="463550" indent="-463550">
+              <a:buFont typeface="+mj-lt"/>
+              <a:buAutoNum type="arabicParenR"/>
+            </a:pPr>
+            <a:endParaRPr lang="en-US" dirty="0">
+              <a:latin typeface="Agency FB" panose="020B0503020202020204" pitchFamily="34" charset="0"/>
+            </a:endParaRPr>
+          </a:p>
+        </p:txBody>
+      </p:sp>
+    </p:spTree>
+    <p:extLst>
+      <p:ext uri="{BB962C8B-B14F-4D97-AF65-F5344CB8AC3E}">
+        <p14:creationId xmlns:p14="http://schemas.microsoft.com/office/powerpoint/2010/main" val="3697813324"/>
+      </p:ext>
+    </p:extLst>
+  </p:cSld>
+  <p:clrMapOvr>
+    <a:masterClrMapping/>
+  </p:clrMapOvr>
+  <mc:AlternateContent xmlns:mc="http://schemas.openxmlformats.org/markup-compatibility/2006" xmlns:p14="http://schemas.microsoft.com/office/powerpoint/2010/main">
+    <mc:Choice Requires="p14">
+      <p:transition spd="slow" p14:dur="1250">
+        <p14:switch dir="r"/>
+      </p:transition>
+    </mc:Choice>
+    <mc:Fallback xmlns="">
+      <p:transition spd="slow">
+        <p:fade/>
+      </p:transition>
+    </mc:Fallback>
+  </mc:AlternateContent>
+</p:sld>
+</file>
+
+<file path=ppt/slides/slide20.xml><?xml version="1.0" encoding="utf-8"?>
 <p:sld xmlns:a="http://schemas.openxmlformats.org/drawingml/2006/main" xmlns:r="http://schemas.openxmlformats.org/officeDocument/2006/relationships" xmlns:p="http://schemas.openxmlformats.org/presentationml/2006/main">
   <p:cSld>
     <p:spTree>
@@ -6805,165 +7619,6 @@
   <p:clrMapOvr>
     <a:masterClrMapping/>
   </p:clrMapOvr>
-</p:sld>
-</file>
-
-<file path=ppt/slides/slide2.xml><?xml version="1.0" encoding="utf-8"?>
-<p:sld xmlns:a="http://schemas.openxmlformats.org/drawingml/2006/main" xmlns:r="http://schemas.openxmlformats.org/officeDocument/2006/relationships" xmlns:p="http://schemas.openxmlformats.org/presentationml/2006/main">
-  <p:cSld>
-    <p:spTree>
-      <p:nvGrpSpPr>
-        <p:cNvPr id="1" name=""/>
-        <p:cNvGrpSpPr/>
-        <p:nvPr/>
-      </p:nvGrpSpPr>
-      <p:grpSpPr>
-        <a:xfrm>
-          <a:off x="0" y="0"/>
-          <a:ext cx="0" cy="0"/>
-          <a:chOff x="0" y="0"/>
-          <a:chExt cx="0" cy="0"/>
-        </a:xfrm>
-      </p:grpSpPr>
-      <p:sp>
-        <p:nvSpPr>
-          <p:cNvPr id="2" name="Title 1"/>
-          <p:cNvSpPr>
-            <a:spLocks noGrp="1"/>
-          </p:cNvSpPr>
-          <p:nvPr>
-            <p:ph type="title"/>
-          </p:nvPr>
-        </p:nvSpPr>
-        <p:spPr/>
-        <p:txBody>
-          <a:bodyPr/>
-          <a:lstStyle/>
-          <a:p>
-            <a:r>
-              <a:rPr lang="id-ID" b="1" dirty="0"/>
-              <a:t>0</a:t>
-            </a:r>
-            <a:r>
-              <a:rPr lang="en-US" b="1" dirty="0"/>
-              <a:t>4</a:t>
-            </a:r>
-            <a:r>
-              <a:rPr lang="id-ID" b="1" dirty="0"/>
-              <a:t>. </a:t>
-            </a:r>
-            <a:r>
-              <a:rPr lang="en-US" b="1" dirty="0"/>
-              <a:t>Encapsulation</a:t>
-            </a:r>
-            <a:endParaRPr lang="en-US" b="1" dirty="0">
-              <a:latin typeface="Agency FB" panose="020B0503020202020204" pitchFamily="34" charset="0"/>
-            </a:endParaRPr>
-          </a:p>
-        </p:txBody>
-      </p:sp>
-      <p:sp>
-        <p:nvSpPr>
-          <p:cNvPr id="3" name="Content Placeholder 2"/>
-          <p:cNvSpPr>
-            <a:spLocks noGrp="1"/>
-          </p:cNvSpPr>
-          <p:nvPr>
-            <p:ph idx="1"/>
-          </p:nvPr>
-        </p:nvSpPr>
-        <p:spPr/>
-        <p:txBody>
-          <a:bodyPr/>
-          <a:lstStyle/>
-          <a:p>
-            <a:pPr marL="463550" indent="-463550">
-              <a:buFont typeface="+mj-lt"/>
-              <a:buAutoNum type="arabicParenR"/>
-            </a:pPr>
-            <a:r>
-              <a:rPr lang="en-US" dirty="0" err="1">
-                <a:latin typeface="Agency FB" panose="020B0503020202020204" pitchFamily="34" charset="0"/>
-              </a:rPr>
-              <a:t>Konsep</a:t>
-            </a:r>
-            <a:r>
-              <a:rPr lang="en-US" dirty="0">
-                <a:latin typeface="Agency FB" panose="020B0503020202020204" pitchFamily="34" charset="0"/>
-              </a:rPr>
-              <a:t> Encapsulation</a:t>
-            </a:r>
-          </a:p>
-          <a:p>
-            <a:pPr marL="463550" indent="-463550">
-              <a:buFont typeface="+mj-lt"/>
-              <a:buAutoNum type="arabicParenR"/>
-            </a:pPr>
-            <a:r>
-              <a:rPr lang="en-US" dirty="0">
-                <a:latin typeface="Agency FB" panose="020B0503020202020204" pitchFamily="34" charset="0"/>
-              </a:rPr>
-              <a:t>Access Modifier</a:t>
-            </a:r>
-          </a:p>
-          <a:p>
-            <a:pPr marL="463550" indent="-463550">
-              <a:buFont typeface="+mj-lt"/>
-              <a:buAutoNum type="arabicParenR"/>
-            </a:pPr>
-            <a:r>
-              <a:rPr lang="en-US" dirty="0">
-                <a:latin typeface="Agency FB" panose="020B0503020202020204" pitchFamily="34" charset="0"/>
-              </a:rPr>
-              <a:t>UML class diagram </a:t>
-            </a:r>
-            <a:r>
-              <a:rPr lang="en-US" dirty="0">
-                <a:latin typeface="Agency FB" panose="020B0503020202020204" pitchFamily="34" charset="0"/>
-                <a:sym typeface="Wingdings" panose="05000000000000000000" pitchFamily="2" charset="2"/>
-              </a:rPr>
-              <a:t></a:t>
-            </a:r>
-            <a:r>
-              <a:rPr lang="en-US" dirty="0">
-                <a:latin typeface="Agency FB" panose="020B0503020202020204" pitchFamily="34" charset="0"/>
-              </a:rPr>
-              <a:t> code</a:t>
-            </a:r>
-          </a:p>
-          <a:p>
-            <a:pPr marL="463550" indent="-463550">
-              <a:buFont typeface="+mj-lt"/>
-              <a:buAutoNum type="arabicParenR"/>
-            </a:pPr>
-            <a:endParaRPr lang="en-US" dirty="0">
-              <a:latin typeface="Agency FB" panose="020B0503020202020204" pitchFamily="34" charset="0"/>
-            </a:endParaRPr>
-          </a:p>
-        </p:txBody>
-      </p:sp>
-    </p:spTree>
-    <p:extLst>
-      <p:ext uri="{BB962C8B-B14F-4D97-AF65-F5344CB8AC3E}">
-        <p14:creationId xmlns:p14="http://schemas.microsoft.com/office/powerpoint/2010/main" val="3697813324"/>
-      </p:ext>
-    </p:extLst>
-  </p:cSld>
-  <p:clrMapOvr>
-    <a:masterClrMapping/>
-  </p:clrMapOvr>
-  <mc:AlternateContent xmlns:mc="http://schemas.openxmlformats.org/markup-compatibility/2006" xmlns:p14="http://schemas.microsoft.com/office/powerpoint/2010/main">
-    <mc:Choice Requires="p14">
-      <p:transition spd="slow" p14:dur="1250">
-        <p14:switch dir="r"/>
-      </p:transition>
-    </mc:Choice>
-    <mc:Fallback xmlns="">
-      <p:transition spd="slow">
-        <p:fade/>
-      </p:transition>
-    </mc:Fallback>
-  </mc:AlternateContent>
 </p:sld>
 </file>
 

</xml_diff>